<commit_message>
Task 1 last update
</commit_message>
<xml_diff>
--- a/MahmoudOsama_EmbeddedSWDesign_Task1.pptx
+++ b/MahmoudOsama_EmbeddedSWDesign_Task1.pptx
@@ -122,10 +122,40 @@
 <file path=ppt/revisionInfo.xml><?xml version="1.0" encoding="utf-8"?>
 <p1510:revInfo xmlns:a="http://schemas.openxmlformats.org/drawingml/2006/main" xmlns:r="http://schemas.openxmlformats.org/officeDocument/2006/relationships" xmlns:p1510="http://schemas.microsoft.com/office/powerpoint/2015/10/main">
   <p1510:revLst>
+    <p1510:client id="{8932D3E1-632B-405A-A373-97B46602D121}" v="8" dt="2020-08-17T16:17:58.773"/>
     <p1510:client id="{9C3DE039-BF12-40C1-AC5B-0B3E07FD60C8}" v="342" dt="2020-08-17T16:04:45.399"/>
     <p1510:client id="{A80F3C76-3A2B-486E-B678-E783AA815537}" v="709" dt="2020-08-15T20:53:15.078"/>
   </p1510:revLst>
 </p1510:revInfo>
+</file>
+
+<file path=ppt/changesInfos/changesInfo1.xml><?xml version="1.0" encoding="utf-8"?>
+<pc:chgInfo xmlns:a="http://schemas.openxmlformats.org/drawingml/2006/main" xmlns:r="http://schemas.openxmlformats.org/officeDocument/2006/relationships" xmlns:ac="http://schemas.microsoft.com/office/drawing/2013/main/command" xmlns:pc="http://schemas.microsoft.com/office/powerpoint/2013/main/command">
+  <pc:docChgLst>
+    <pc:chgData name="Guest User" userId="9d0bb21a805da851" providerId="Windows Live" clId="Web-{8932D3E1-632B-405A-A373-97B46602D121}"/>
+    <pc:docChg chg="modSld">
+      <pc:chgData name="Guest User" userId="9d0bb21a805da851" providerId="Windows Live" clId="Web-{8932D3E1-632B-405A-A373-97B46602D121}" dt="2020-08-17T16:17:58.773" v="7" actId="20577"/>
+      <pc:docMkLst>
+        <pc:docMk/>
+      </pc:docMkLst>
+      <pc:sldChg chg="modSp">
+        <pc:chgData name="Guest User" userId="9d0bb21a805da851" providerId="Windows Live" clId="Web-{8932D3E1-632B-405A-A373-97B46602D121}" dt="2020-08-17T16:17:58.758" v="6" actId="20577"/>
+        <pc:sldMkLst>
+          <pc:docMk/>
+          <pc:sldMk cId="1542301036" sldId="261"/>
+        </pc:sldMkLst>
+        <pc:spChg chg="mod">
+          <ac:chgData name="Guest User" userId="9d0bb21a805da851" providerId="Windows Live" clId="Web-{8932D3E1-632B-405A-A373-97B46602D121}" dt="2020-08-17T16:17:58.758" v="6" actId="20577"/>
+          <ac:spMkLst>
+            <pc:docMk/>
+            <pc:sldMk cId="1542301036" sldId="261"/>
+            <ac:spMk id="3" creationId="{3181FC7B-425F-40C6-95A5-132EC217040B}"/>
+          </ac:spMkLst>
+        </pc:spChg>
+      </pc:sldChg>
+    </pc:docChg>
+  </pc:docChgLst>
+</pc:chgInfo>
 </file>
 
 <file path=ppt/slideLayouts/slideLayout1.xml><?xml version="1.0" encoding="utf-8"?>
@@ -6692,29 +6722,12 @@
           <a:p>
             <a:r>
               <a:rPr lang="en-US" dirty="0" err="1"/>
-              <a:t>Motor_Left</a:t>
+              <a:t>Motor_Stop</a:t>
             </a:r>
             <a:r>
               <a:rPr lang="en-US" dirty="0"/>
               <a:t>()</a:t>
             </a:r>
-          </a:p>
-          <a:p>
-            <a:r>
-              <a:rPr lang="en-US" dirty="0" err="1"/>
-              <a:t>Motor_Right</a:t>
-            </a:r>
-            <a:r>
-              <a:rPr lang="en-US" dirty="0"/>
-              <a:t>()</a:t>
-            </a:r>
-          </a:p>
-          <a:p>
-            <a:r>
-              <a:rPr lang="en-US"/>
-              <a:t>Motor_Stop()</a:t>
-            </a:r>
-            <a:endParaRPr lang="en-US" dirty="0"/>
           </a:p>
         </p:txBody>
       </p:sp>

</xml_diff>